<commit_message>
Complete the CNN model for multi-modal learning.
</commit_message>
<xml_diff>
--- a/Exp_Result.pptx
+++ b/Exp_Result.pptx
@@ -106,6 +106,11 @@
       </a:defRPr>
     </a:lvl9pPr>
   </p:defaultTextStyle>
+  <p:extLst>
+    <p:ext uri="{EFAFB233-063F-42B5-8137-9DF3F51BA10A}">
+      <p15:sldGuideLst xmlns:p15="http://schemas.microsoft.com/office/powerpoint/2012/main"/>
+    </p:ext>
+  </p:extLst>
 </p:presentation>
 </file>
 
@@ -256,7 +261,7 @@
           <a:p>
             <a:fld id="{A8172EA5-0CF1-4E31-8D1D-D091C1B5D753}" type="datetimeFigureOut">
               <a:rPr lang="en-US" smtClean="0"/>
-              <a:t>12/2/2021</a:t>
+              <a:t>12/3/2021</a:t>
             </a:fld>
             <a:endParaRPr lang="en-US"/>
           </a:p>
@@ -454,7 +459,7 @@
           <a:p>
             <a:fld id="{A8172EA5-0CF1-4E31-8D1D-D091C1B5D753}" type="datetimeFigureOut">
               <a:rPr lang="en-US" smtClean="0"/>
-              <a:t>12/2/2021</a:t>
+              <a:t>12/3/2021</a:t>
             </a:fld>
             <a:endParaRPr lang="en-US"/>
           </a:p>
@@ -662,7 +667,7 @@
           <a:p>
             <a:fld id="{A8172EA5-0CF1-4E31-8D1D-D091C1B5D753}" type="datetimeFigureOut">
               <a:rPr lang="en-US" smtClean="0"/>
-              <a:t>12/2/2021</a:t>
+              <a:t>12/3/2021</a:t>
             </a:fld>
             <a:endParaRPr lang="en-US"/>
           </a:p>
@@ -860,7 +865,7 @@
           <a:p>
             <a:fld id="{A8172EA5-0CF1-4E31-8D1D-D091C1B5D753}" type="datetimeFigureOut">
               <a:rPr lang="en-US" smtClean="0"/>
-              <a:t>12/2/2021</a:t>
+              <a:t>12/3/2021</a:t>
             </a:fld>
             <a:endParaRPr lang="en-US"/>
           </a:p>
@@ -1135,7 +1140,7 @@
           <a:p>
             <a:fld id="{A8172EA5-0CF1-4E31-8D1D-D091C1B5D753}" type="datetimeFigureOut">
               <a:rPr lang="en-US" smtClean="0"/>
-              <a:t>12/2/2021</a:t>
+              <a:t>12/3/2021</a:t>
             </a:fld>
             <a:endParaRPr lang="en-US"/>
           </a:p>
@@ -1400,7 +1405,7 @@
           <a:p>
             <a:fld id="{A8172EA5-0CF1-4E31-8D1D-D091C1B5D753}" type="datetimeFigureOut">
               <a:rPr lang="en-US" smtClean="0"/>
-              <a:t>12/2/2021</a:t>
+              <a:t>12/3/2021</a:t>
             </a:fld>
             <a:endParaRPr lang="en-US"/>
           </a:p>
@@ -1812,7 +1817,7 @@
           <a:p>
             <a:fld id="{A8172EA5-0CF1-4E31-8D1D-D091C1B5D753}" type="datetimeFigureOut">
               <a:rPr lang="en-US" smtClean="0"/>
-              <a:t>12/2/2021</a:t>
+              <a:t>12/3/2021</a:t>
             </a:fld>
             <a:endParaRPr lang="en-US"/>
           </a:p>
@@ -1953,7 +1958,7 @@
           <a:p>
             <a:fld id="{A8172EA5-0CF1-4E31-8D1D-D091C1B5D753}" type="datetimeFigureOut">
               <a:rPr lang="en-US" smtClean="0"/>
-              <a:t>12/2/2021</a:t>
+              <a:t>12/3/2021</a:t>
             </a:fld>
             <a:endParaRPr lang="en-US"/>
           </a:p>
@@ -2066,7 +2071,7 @@
           <a:p>
             <a:fld id="{A8172EA5-0CF1-4E31-8D1D-D091C1B5D753}" type="datetimeFigureOut">
               <a:rPr lang="en-US" smtClean="0"/>
-              <a:t>12/2/2021</a:t>
+              <a:t>12/3/2021</a:t>
             </a:fld>
             <a:endParaRPr lang="en-US"/>
           </a:p>
@@ -2377,7 +2382,7 @@
           <a:p>
             <a:fld id="{A8172EA5-0CF1-4E31-8D1D-D091C1B5D753}" type="datetimeFigureOut">
               <a:rPr lang="en-US" smtClean="0"/>
-              <a:t>12/2/2021</a:t>
+              <a:t>12/3/2021</a:t>
             </a:fld>
             <a:endParaRPr lang="en-US"/>
           </a:p>
@@ -2665,7 +2670,7 @@
           <a:p>
             <a:fld id="{A8172EA5-0CF1-4E31-8D1D-D091C1B5D753}" type="datetimeFigureOut">
               <a:rPr lang="en-US" smtClean="0"/>
-              <a:t>12/2/2021</a:t>
+              <a:t>12/3/2021</a:t>
             </a:fld>
             <a:endParaRPr lang="en-US"/>
           </a:p>
@@ -2906,7 +2911,7 @@
           <a:p>
             <a:fld id="{A8172EA5-0CF1-4E31-8D1D-D091C1B5D753}" type="datetimeFigureOut">
               <a:rPr lang="en-US" smtClean="0"/>
-              <a:t>12/2/2021</a:t>
+              <a:t>12/3/2021</a:t>
             </a:fld>
             <a:endParaRPr lang="en-US"/>
           </a:p>
@@ -3472,7 +3477,7 @@
         <p:spPr>
           <a:xfrm>
             <a:off x="541536" y="2481791"/>
-            <a:ext cx="2343708" cy="707886"/>
+            <a:ext cx="2343708" cy="400110"/>
           </a:xfrm>
           <a:prstGeom prst="rect">
             <a:avLst/>
@@ -3480,7 +3485,7 @@
           <a:noFill/>
           <a:ln w="28575" cap="flat" cmpd="sng" algn="ctr">
             <a:solidFill>
-              <a:schemeClr val="dk1"/>
+              <a:srgbClr val="C00000"/>
             </a:solidFill>
             <a:prstDash val="solid"/>
             <a:round/>
@@ -3506,32 +3511,27 @@
           <a:bodyPr wrap="square" rtlCol="0">
             <a:spAutoFit/>
           </a:bodyPr>
-          <a:lstStyle/>
-          <a:p>
-            <a:pPr algn="ctr"/>
-            <a:r>
-              <a:rPr lang="en-US" altLang="zh-CN" sz="2000" b="1" dirty="0">
+          <a:lstStyle>
+            <a:defPPr>
+              <a:defRPr lang="en-US"/>
+            </a:defPPr>
+            <a:lvl1pPr algn="ctr">
+              <a:defRPr sz="2000" b="1">
+                <a:solidFill>
+                  <a:srgbClr val="C00000"/>
+                </a:solidFill>
                 <a:latin typeface="CMU Serif" panose="02000603000000000000" pitchFamily="2" charset="0"/>
                 <a:ea typeface="CMU Serif" panose="02000603000000000000" pitchFamily="2" charset="0"/>
                 <a:cs typeface="CMU Serif" panose="02000603000000000000" pitchFamily="2" charset="0"/>
-              </a:rPr>
-              <a:t>bag of word </a:t>
-            </a:r>
-          </a:p>
-          <a:p>
-            <a:pPr algn="ctr"/>
-            <a:r>
-              <a:rPr lang="en-US" altLang="zh-CN" sz="2000" b="1" dirty="0">
-                <a:latin typeface="CMU Serif" panose="02000603000000000000" pitchFamily="2" charset="0"/>
-                <a:ea typeface="CMU Serif" panose="02000603000000000000" pitchFamily="2" charset="0"/>
-                <a:cs typeface="CMU Serif" panose="02000603000000000000" pitchFamily="2" charset="0"/>
-              </a:rPr>
-              <a:t>(term frequency)</a:t>
-            </a:r>
-            <a:endParaRPr lang="zh-CN" altLang="en-US" sz="2000" b="1" dirty="0">
-              <a:latin typeface="CMU Serif" panose="02000603000000000000" pitchFamily="2" charset="0"/>
-              <a:cs typeface="CMU Serif" panose="02000603000000000000" pitchFamily="2" charset="0"/>
-            </a:endParaRPr>
+              </a:defRPr>
+            </a:lvl1pPr>
+          </a:lstStyle>
+          <a:p>
+            <a:r>
+              <a:rPr lang="en-US" altLang="zh-CN"/>
+              <a:t>text encoding</a:t>
+            </a:r>
+            <a:endParaRPr lang="zh-CN" altLang="en-US" dirty="0"/>
           </a:p>
         </p:txBody>
       </p:sp>
@@ -3596,7 +3596,7 @@
                 <a:ea typeface="CMU Serif" panose="02000603000000000000" pitchFamily="2" charset="0"/>
                 <a:cs typeface="CMU Serif" panose="02000603000000000000" pitchFamily="2" charset="0"/>
               </a:rPr>
-              <a:t>encoder</a:t>
+              <a:t>text encoder</a:t>
             </a:r>
             <a:endParaRPr lang="zh-CN" altLang="en-US" sz="2000" b="1" dirty="0">
               <a:solidFill>
@@ -3832,7 +3832,7 @@
           <a:noFill/>
           <a:ln w="28575" cap="flat" cmpd="sng" algn="ctr">
             <a:solidFill>
-              <a:srgbClr val="0070C0"/>
+              <a:schemeClr val="dk1"/>
             </a:solidFill>
             <a:prstDash val="solid"/>
             <a:round/>
@@ -3858,27 +3858,24 @@
           <a:bodyPr wrap="square" rtlCol="0">
             <a:spAutoFit/>
           </a:bodyPr>
-          <a:lstStyle/>
-          <a:p>
-            <a:pPr algn="ctr"/>
-            <a:r>
-              <a:rPr lang="en-US" altLang="zh-CN" sz="2000" b="1" dirty="0">
-                <a:solidFill>
-                  <a:srgbClr val="0070C0"/>
-                </a:solidFill>
+          <a:lstStyle>
+            <a:defPPr>
+              <a:defRPr lang="en-US"/>
+            </a:defPPr>
+            <a:lvl1pPr algn="ctr">
+              <a:defRPr sz="2000" b="1">
                 <a:latin typeface="CMU Serif" panose="02000603000000000000" pitchFamily="2" charset="0"/>
                 <a:ea typeface="CMU Serif" panose="02000603000000000000" pitchFamily="2" charset="0"/>
                 <a:cs typeface="CMU Serif" panose="02000603000000000000" pitchFamily="2" charset="0"/>
-              </a:rPr>
+              </a:defRPr>
+            </a:lvl1pPr>
+          </a:lstStyle>
+          <a:p>
+            <a:r>
+              <a:rPr lang="en-US" altLang="zh-CN"/>
               <a:t>prediction head</a:t>
             </a:r>
-            <a:endParaRPr lang="zh-CN" altLang="en-US" sz="2000" b="1" dirty="0">
-              <a:solidFill>
-                <a:srgbClr val="0070C0"/>
-              </a:solidFill>
-              <a:latin typeface="CMU Serif" panose="02000603000000000000" pitchFamily="2" charset="0"/>
-              <a:cs typeface="CMU Serif" panose="02000603000000000000" pitchFamily="2" charset="0"/>
-            </a:endParaRPr>
+            <a:endParaRPr lang="zh-CN" altLang="en-US" dirty="0"/>
           </a:p>
         </p:txBody>
       </p:sp>
@@ -3985,8 +3982,8 @@
         </p:nvCxnSpPr>
         <p:spPr>
           <a:xfrm flipH="1">
-            <a:off x="1713389" y="3189677"/>
-            <a:ext cx="1" cy="516750"/>
+            <a:off x="1713389" y="2881901"/>
+            <a:ext cx="1" cy="824526"/>
           </a:xfrm>
           <a:prstGeom prst="straightConnector1">
             <a:avLst/>
@@ -4107,15 +4104,15 @@
           </p:cNvPr>
           <p:cNvCxnSpPr>
             <a:cxnSpLocks/>
-            <a:stCxn id="7" idx="2"/>
+            <a:stCxn id="17" idx="2"/>
             <a:endCxn id="8" idx="3"/>
           </p:cNvCxnSpPr>
           <p:nvPr/>
         </p:nvCxnSpPr>
         <p:spPr>
           <a:xfrm rot="5400000">
-            <a:off x="3966119" y="3271278"/>
-            <a:ext cx="2814184" cy="551895"/>
+            <a:off x="4582839" y="3887791"/>
+            <a:ext cx="1580951" cy="552101"/>
           </a:xfrm>
           <a:prstGeom prst="curvedConnector2">
             <a:avLst/>
@@ -4182,6 +4179,283 @@
           </a:fontRef>
         </p:style>
       </p:cxnSp>
+      <p:sp>
+        <p:nvSpPr>
+          <p:cNvPr id="17" name="文本框 4">
+            <a:extLst>
+              <a:ext uri="{FF2B5EF4-FFF2-40B4-BE49-F238E27FC236}">
+                <a16:creationId xmlns:a16="http://schemas.microsoft.com/office/drawing/2014/main" id="{6A4BA3C2-F9DE-487E-B1CC-4230962A83D2}"/>
+              </a:ext>
+            </a:extLst>
+          </p:cNvPr>
+          <p:cNvSpPr txBox="1"/>
+          <p:nvPr/>
+        </p:nvSpPr>
+        <p:spPr>
+          <a:xfrm>
+            <a:off x="4542618" y="2973256"/>
+            <a:ext cx="2213491" cy="400110"/>
+          </a:xfrm>
+          <a:prstGeom prst="rect">
+            <a:avLst/>
+          </a:prstGeom>
+          <a:noFill/>
+          <a:ln w="28575" cap="flat" cmpd="sng" algn="ctr">
+            <a:solidFill>
+              <a:schemeClr val="dk1"/>
+            </a:solidFill>
+            <a:prstDash val="solid"/>
+            <a:round/>
+            <a:headEnd type="none" w="med" len="med"/>
+            <a:tailEnd type="none" w="med" len="med"/>
+          </a:ln>
+        </p:spPr>
+        <p:style>
+          <a:lnRef idx="0">
+            <a:scrgbClr r="0" g="0" b="0"/>
+          </a:lnRef>
+          <a:fillRef idx="0">
+            <a:scrgbClr r="0" g="0" b="0"/>
+          </a:fillRef>
+          <a:effectRef idx="0">
+            <a:scrgbClr r="0" g="0" b="0"/>
+          </a:effectRef>
+          <a:fontRef idx="minor">
+            <a:schemeClr val="dk1"/>
+          </a:fontRef>
+        </p:style>
+        <p:txBody>
+          <a:bodyPr wrap="square" rtlCol="0">
+            <a:spAutoFit/>
+          </a:bodyPr>
+          <a:lstStyle>
+            <a:defPPr>
+              <a:defRPr lang="en-US"/>
+            </a:defPPr>
+            <a:lvl1pPr algn="ctr">
+              <a:defRPr sz="2000" b="1">
+                <a:latin typeface="CMU Serif" panose="02000603000000000000" pitchFamily="2" charset="0"/>
+                <a:ea typeface="CMU Serif" panose="02000603000000000000" pitchFamily="2" charset="0"/>
+                <a:cs typeface="CMU Serif" panose="02000603000000000000" pitchFamily="2" charset="0"/>
+              </a:defRPr>
+            </a:lvl1pPr>
+          </a:lstStyle>
+          <a:p>
+            <a:r>
+              <a:rPr lang="en-US" altLang="zh-CN"/>
+              <a:t>Linear layer</a:t>
+            </a:r>
+            <a:endParaRPr lang="zh-CN" altLang="en-US" dirty="0"/>
+          </a:p>
+        </p:txBody>
+      </p:sp>
+      <p:cxnSp>
+        <p:nvCxnSpPr>
+          <p:cNvPr id="20" name="直接箭头连接符 18">
+            <a:extLst>
+              <a:ext uri="{FF2B5EF4-FFF2-40B4-BE49-F238E27FC236}">
+                <a16:creationId xmlns:a16="http://schemas.microsoft.com/office/drawing/2014/main" id="{2B2B70F2-8468-456C-86FA-C71671C4C49C}"/>
+              </a:ext>
+            </a:extLst>
+          </p:cNvPr>
+          <p:cNvCxnSpPr>
+            <a:cxnSpLocks/>
+            <a:stCxn id="7" idx="2"/>
+            <a:endCxn id="17" idx="0"/>
+          </p:cNvCxnSpPr>
+          <p:nvPr/>
+        </p:nvCxnSpPr>
+        <p:spPr>
+          <a:xfrm>
+            <a:off x="5649158" y="2140133"/>
+            <a:ext cx="206" cy="833123"/>
+          </a:xfrm>
+          <a:prstGeom prst="straightConnector1">
+            <a:avLst/>
+          </a:prstGeom>
+          <a:ln w="38100">
+            <a:tailEnd type="triangle"/>
+          </a:ln>
+        </p:spPr>
+        <p:style>
+          <a:lnRef idx="3">
+            <a:schemeClr val="dk1"/>
+          </a:lnRef>
+          <a:fillRef idx="0">
+            <a:schemeClr val="dk1"/>
+          </a:fillRef>
+          <a:effectRef idx="2">
+            <a:schemeClr val="dk1"/>
+          </a:effectRef>
+          <a:fontRef idx="minor">
+            <a:schemeClr val="tx1"/>
+          </a:fontRef>
+        </p:style>
+      </p:cxnSp>
+      <p:sp>
+        <p:nvSpPr>
+          <p:cNvPr id="23" name="TextBox 22">
+            <a:extLst>
+              <a:ext uri="{FF2B5EF4-FFF2-40B4-BE49-F238E27FC236}">
+                <a16:creationId xmlns:a16="http://schemas.microsoft.com/office/drawing/2014/main" id="{13D4C13C-ADB2-4357-8FA2-E216F2934186}"/>
+              </a:ext>
+            </a:extLst>
+          </p:cNvPr>
+          <p:cNvSpPr txBox="1"/>
+          <p:nvPr/>
+        </p:nvSpPr>
+        <p:spPr>
+          <a:xfrm>
+            <a:off x="7453993" y="933818"/>
+            <a:ext cx="1747594" cy="400110"/>
+          </a:xfrm>
+          <a:prstGeom prst="rect">
+            <a:avLst/>
+          </a:prstGeom>
+          <a:noFill/>
+        </p:spPr>
+        <p:txBody>
+          <a:bodyPr wrap="none" rtlCol="0">
+            <a:spAutoFit/>
+          </a:bodyPr>
+          <a:lstStyle/>
+          <a:p>
+            <a:pPr marL="342900" indent="-342900">
+              <a:buFont typeface="Arial" panose="020B0604020202020204" pitchFamily="34" charset="0"/>
+              <a:buChar char="•"/>
+            </a:pPr>
+            <a:r>
+              <a:rPr lang="en-US" sz="2000" b="1" dirty="0">
+                <a:latin typeface="CMU Serif" panose="02000603000000000000" pitchFamily="2" charset="0"/>
+                <a:ea typeface="CMU Serif" panose="02000603000000000000" pitchFamily="2" charset="0"/>
+                <a:cs typeface="CMU Serif" panose="02000603000000000000" pitchFamily="2" charset="0"/>
+              </a:rPr>
+              <a:t>Option 1:</a:t>
+            </a:r>
+          </a:p>
+        </p:txBody>
+      </p:sp>
+      <p:sp>
+        <p:nvSpPr>
+          <p:cNvPr id="24" name="TextBox 23">
+            <a:extLst>
+              <a:ext uri="{FF2B5EF4-FFF2-40B4-BE49-F238E27FC236}">
+                <a16:creationId xmlns:a16="http://schemas.microsoft.com/office/drawing/2014/main" id="{5EF9549C-5DAF-47E8-A50A-34C002E931A7}"/>
+              </a:ext>
+            </a:extLst>
+          </p:cNvPr>
+          <p:cNvSpPr txBox="1"/>
+          <p:nvPr/>
+        </p:nvSpPr>
+        <p:spPr>
+          <a:xfrm>
+            <a:off x="8107599" y="1415299"/>
+            <a:ext cx="3605474" cy="400110"/>
+          </a:xfrm>
+          <a:prstGeom prst="rect">
+            <a:avLst/>
+          </a:prstGeom>
+          <a:noFill/>
+        </p:spPr>
+        <p:txBody>
+          <a:bodyPr wrap="none" rtlCol="0">
+            <a:spAutoFit/>
+          </a:bodyPr>
+          <a:lstStyle/>
+          <a:p>
+            <a:r>
+              <a:rPr lang="en-US" sz="2000" dirty="0">
+                <a:latin typeface="CMU Serif" panose="02000603000000000000" pitchFamily="2" charset="0"/>
+                <a:ea typeface="CMU Serif" panose="02000603000000000000" pitchFamily="2" charset="0"/>
+                <a:cs typeface="CMU Serif" panose="02000603000000000000" pitchFamily="2" charset="0"/>
+              </a:rPr>
+              <a:t>term frequency + linear layers</a:t>
+            </a:r>
+          </a:p>
+        </p:txBody>
+      </p:sp>
+      <p:sp>
+        <p:nvSpPr>
+          <p:cNvPr id="26" name="TextBox 25">
+            <a:extLst>
+              <a:ext uri="{FF2B5EF4-FFF2-40B4-BE49-F238E27FC236}">
+                <a16:creationId xmlns:a16="http://schemas.microsoft.com/office/drawing/2014/main" id="{C07E442B-6958-461C-8068-691576E0CBC6}"/>
+              </a:ext>
+            </a:extLst>
+          </p:cNvPr>
+          <p:cNvSpPr txBox="1"/>
+          <p:nvPr/>
+        </p:nvSpPr>
+        <p:spPr>
+          <a:xfrm>
+            <a:off x="7467599" y="2441490"/>
+            <a:ext cx="1747594" cy="400110"/>
+          </a:xfrm>
+          <a:prstGeom prst="rect">
+            <a:avLst/>
+          </a:prstGeom>
+          <a:noFill/>
+        </p:spPr>
+        <p:txBody>
+          <a:bodyPr wrap="none" rtlCol="0">
+            <a:spAutoFit/>
+          </a:bodyPr>
+          <a:lstStyle/>
+          <a:p>
+            <a:pPr marL="342900" indent="-342900">
+              <a:buFont typeface="Arial" panose="020B0604020202020204" pitchFamily="34" charset="0"/>
+              <a:buChar char="•"/>
+            </a:pPr>
+            <a:r>
+              <a:rPr lang="en-US" sz="2000" b="1" dirty="0">
+                <a:latin typeface="CMU Serif" panose="02000603000000000000" pitchFamily="2" charset="0"/>
+                <a:ea typeface="CMU Serif" panose="02000603000000000000" pitchFamily="2" charset="0"/>
+                <a:cs typeface="CMU Serif" panose="02000603000000000000" pitchFamily="2" charset="0"/>
+              </a:rPr>
+              <a:t>Option 2:</a:t>
+            </a:r>
+          </a:p>
+        </p:txBody>
+      </p:sp>
+      <p:sp>
+        <p:nvSpPr>
+          <p:cNvPr id="27" name="TextBox 26">
+            <a:extLst>
+              <a:ext uri="{FF2B5EF4-FFF2-40B4-BE49-F238E27FC236}">
+                <a16:creationId xmlns:a16="http://schemas.microsoft.com/office/drawing/2014/main" id="{3C16B708-5E84-4C70-8649-7BE493849FEF}"/>
+              </a:ext>
+            </a:extLst>
+          </p:cNvPr>
+          <p:cNvSpPr txBox="1"/>
+          <p:nvPr/>
+        </p:nvSpPr>
+        <p:spPr>
+          <a:xfrm>
+            <a:off x="8121205" y="2922971"/>
+            <a:ext cx="3369833" cy="400110"/>
+          </a:xfrm>
+          <a:prstGeom prst="rect">
+            <a:avLst/>
+          </a:prstGeom>
+          <a:noFill/>
+        </p:spPr>
+        <p:txBody>
+          <a:bodyPr wrap="none" rtlCol="0">
+            <a:spAutoFit/>
+          </a:bodyPr>
+          <a:lstStyle/>
+          <a:p>
+            <a:r>
+              <a:rPr lang="en-US" sz="2000" dirty="0">
+                <a:latin typeface="CMU Serif" panose="02000603000000000000" pitchFamily="2" charset="0"/>
+                <a:ea typeface="CMU Serif" panose="02000603000000000000" pitchFamily="2" charset="0"/>
+                <a:cs typeface="CMU Serif" panose="02000603000000000000" pitchFamily="2" charset="0"/>
+              </a:rPr>
+              <a:t>embedding + 1d conv layers</a:t>
+            </a:r>
+          </a:p>
+        </p:txBody>
+      </p:sp>
     </p:spTree>
     <p:extLst>
       <p:ext uri="{BB962C8B-B14F-4D97-AF65-F5344CB8AC3E}">
@@ -4330,6 +4604,49 @@
           </a:prstGeom>
         </p:spPr>
       </p:pic>
+      <p:sp>
+        <p:nvSpPr>
+          <p:cNvPr id="5" name="TextBox 4">
+            <a:extLst>
+              <a:ext uri="{FF2B5EF4-FFF2-40B4-BE49-F238E27FC236}">
+                <a16:creationId xmlns:a16="http://schemas.microsoft.com/office/drawing/2014/main" id="{71CB1B01-1BF2-4838-BBEB-5561CF7EEDDD}"/>
+              </a:ext>
+            </a:extLst>
+          </p:cNvPr>
+          <p:cNvSpPr txBox="1"/>
+          <p:nvPr/>
+        </p:nvSpPr>
+        <p:spPr>
+          <a:xfrm>
+            <a:off x="4068535" y="879022"/>
+            <a:ext cx="2510624" cy="369332"/>
+          </a:xfrm>
+          <a:prstGeom prst="rect">
+            <a:avLst/>
+          </a:prstGeom>
+          <a:noFill/>
+        </p:spPr>
+        <p:txBody>
+          <a:bodyPr wrap="none" rtlCol="0">
+            <a:spAutoFit/>
+          </a:bodyPr>
+          <a:lstStyle/>
+          <a:p>
+            <a:pPr marL="285750" indent="-285750">
+              <a:buFont typeface="Arial" panose="020B0604020202020204" pitchFamily="34" charset="0"/>
+              <a:buChar char="•"/>
+            </a:pPr>
+            <a:r>
+              <a:rPr lang="en-US" dirty="0">
+                <a:latin typeface="CMU Serif" panose="02000603000000000000" pitchFamily="2" charset="0"/>
+                <a:ea typeface="CMU Serif" panose="02000603000000000000" pitchFamily="2" charset="0"/>
+                <a:cs typeface="CMU Serif" panose="02000603000000000000" pitchFamily="2" charset="0"/>
+              </a:rPr>
+              <a:t>Test accuracy = 0.6</a:t>
+            </a:r>
+          </a:p>
+        </p:txBody>
+      </p:sp>
     </p:spTree>
     <p:extLst>
       <p:ext uri="{BB962C8B-B14F-4D97-AF65-F5344CB8AC3E}">
@@ -4375,7 +4692,7 @@
         <p:spPr>
           <a:xfrm>
             <a:off x="106135" y="212272"/>
-            <a:ext cx="2646878" cy="461665"/>
+            <a:ext cx="2081019" cy="461665"/>
           </a:xfrm>
           <a:prstGeom prst="rect">
             <a:avLst/>
@@ -4394,7 +4711,7 @@
                 <a:ea typeface="CMU Serif" panose="02000603000000000000" pitchFamily="2" charset="0"/>
                 <a:cs typeface="CMU Serif" panose="02000603000000000000" pitchFamily="2" charset="0"/>
               </a:rPr>
-              <a:t>1D CNN Model</a:t>
+              <a:t>CNN Model</a:t>
             </a:r>
           </a:p>
         </p:txBody>
@@ -4414,7 +4731,7 @@
         <p:spPr>
           <a:xfrm>
             <a:off x="495299" y="879022"/>
-            <a:ext cx="2444900" cy="369332"/>
+            <a:ext cx="2443298" cy="369332"/>
           </a:xfrm>
           <a:prstGeom prst="rect">
             <a:avLst/>
@@ -4437,11 +4754,90 @@
                 <a:ea typeface="CMU Serif" panose="02000603000000000000" pitchFamily="2" charset="0"/>
                 <a:cs typeface="CMU Serif" panose="02000603000000000000" pitchFamily="2" charset="0"/>
               </a:rPr>
-              <a:t>Train for 20 epochs</a:t>
-            </a:r>
-          </a:p>
-        </p:txBody>
-      </p:sp>
+              <a:t>Train for 10 epochs</a:t>
+            </a:r>
+          </a:p>
+        </p:txBody>
+      </p:sp>
+      <p:sp>
+        <p:nvSpPr>
+          <p:cNvPr id="4" name="TextBox 3">
+            <a:extLst>
+              <a:ext uri="{FF2B5EF4-FFF2-40B4-BE49-F238E27FC236}">
+                <a16:creationId xmlns:a16="http://schemas.microsoft.com/office/drawing/2014/main" id="{0C34BAA0-5DC4-454B-9155-CF6B5A32C079}"/>
+              </a:ext>
+            </a:extLst>
+          </p:cNvPr>
+          <p:cNvSpPr txBox="1"/>
+          <p:nvPr/>
+        </p:nvSpPr>
+        <p:spPr>
+          <a:xfrm>
+            <a:off x="4068535" y="879022"/>
+            <a:ext cx="2696572" cy="369332"/>
+          </a:xfrm>
+          <a:prstGeom prst="rect">
+            <a:avLst/>
+          </a:prstGeom>
+          <a:noFill/>
+        </p:spPr>
+        <p:txBody>
+          <a:bodyPr wrap="none" rtlCol="0">
+            <a:spAutoFit/>
+          </a:bodyPr>
+          <a:lstStyle/>
+          <a:p>
+            <a:pPr marL="285750" indent="-285750">
+              <a:buFont typeface="Arial" panose="020B0604020202020204" pitchFamily="34" charset="0"/>
+              <a:buChar char="•"/>
+            </a:pPr>
+            <a:r>
+              <a:rPr lang="en-US" dirty="0">
+                <a:latin typeface="CMU Serif" panose="02000603000000000000" pitchFamily="2" charset="0"/>
+                <a:ea typeface="CMU Serif" panose="02000603000000000000" pitchFamily="2" charset="0"/>
+                <a:cs typeface="CMU Serif" panose="02000603000000000000" pitchFamily="2" charset="0"/>
+              </a:rPr>
+              <a:t>Test accuracy = 0.33 </a:t>
+            </a:r>
+          </a:p>
+        </p:txBody>
+      </p:sp>
+      <p:pic>
+        <p:nvPicPr>
+          <p:cNvPr id="8" name="Picture 7" descr="Figure 1">
+            <a:extLst>
+              <a:ext uri="{FF2B5EF4-FFF2-40B4-BE49-F238E27FC236}">
+                <a16:creationId xmlns:a16="http://schemas.microsoft.com/office/drawing/2014/main" id="{6A6AF981-93E4-4135-B543-AE603FF8AAF6}"/>
+              </a:ext>
+            </a:extLst>
+          </p:cNvPr>
+          <p:cNvPicPr>
+            <a:picLocks noChangeAspect="1"/>
+          </p:cNvPicPr>
+          <p:nvPr/>
+        </p:nvPicPr>
+        <p:blipFill>
+          <a:blip r:embed="rId2">
+            <a:extLst>
+              <a:ext uri="{28A0092B-C50C-407E-A947-70E740481C1C}">
+                <a14:useLocalDpi xmlns:a14="http://schemas.microsoft.com/office/drawing/2010/main" val="0"/>
+              </a:ext>
+            </a:extLst>
+          </a:blip>
+          <a:stretch>
+            <a:fillRect/>
+          </a:stretch>
+        </p:blipFill>
+        <p:spPr>
+          <a:xfrm>
+            <a:off x="1070728" y="1673305"/>
+            <a:ext cx="9838273" cy="4305673"/>
+          </a:xfrm>
+          <a:prstGeom prst="rect">
+            <a:avLst/>
+          </a:prstGeom>
+        </p:spPr>
+      </p:pic>
     </p:spTree>
     <p:extLst>
       <p:ext uri="{BB962C8B-B14F-4D97-AF65-F5344CB8AC3E}">

</xml_diff>